<commit_message>
Presentation-v4.pptx update Self-assessment Report.docx update
</commit_message>
<xml_diff>
--- a/PM docs/Presentation-v4.pptx
+++ b/PM docs/Presentation-v4.pptx
@@ -24,6 +24,9 @@
     <p:sldId id="266" r:id="rId18"/>
     <p:sldId id="275" r:id="rId19"/>
     <p:sldId id="277" r:id="rId20"/>
+    <p:sldId id="281" r:id="rId21"/>
+    <p:sldId id="280" r:id="rId22"/>
+    <p:sldId id="278" r:id="rId23"/>
   </p:sldIdLst>
   <p:sldSz cx="9144000" cy="6858000" type="screen4x3"/>
   <p:notesSz cx="6858000" cy="9144000"/>
@@ -17688,15 +17691,7 @@
             </a:br>
             <a:r>
               <a:rPr lang="en-GB" dirty="0" smtClean="0"/>
-              <a:t>Ho Sui Cheong </a:t>
-            </a:r>
-            <a:r>
-              <a:rPr lang="en-GB" dirty="0" smtClean="0"/>
-              <a:t>Johnathan</a:t>
-            </a:r>
-            <a:r>
-              <a:rPr lang="en-GB" dirty="0" smtClean="0"/>
-              <a:t>	53117178</a:t>
+              <a:t>Ho Sui Cheong Johnathan	53117178</a:t>
             </a:r>
             <a:endParaRPr lang="en-GB" dirty="0"/>
           </a:p>
@@ -19057,6 +19052,885 @@
 </p:sld>
 </file>
 
+<file path=ppt/slides/slide20.xml><?xml version="1.0" encoding="utf-8"?>
+<p:sld xmlns:a="http://schemas.openxmlformats.org/drawingml/2006/main" xmlns:r="http://schemas.openxmlformats.org/officeDocument/2006/relationships" xmlns:p="http://schemas.openxmlformats.org/presentationml/2006/main">
+  <p:cSld>
+    <p:spTree>
+      <p:nvGrpSpPr>
+        <p:cNvPr id="1" name=""/>
+        <p:cNvGrpSpPr/>
+        <p:nvPr/>
+      </p:nvGrpSpPr>
+      <p:grpSpPr>
+        <a:xfrm>
+          <a:off x="0" y="0"/>
+          <a:ext cx="0" cy="0"/>
+          <a:chOff x="0" y="0"/>
+          <a:chExt cx="0" cy="0"/>
+        </a:xfrm>
+      </p:grpSpPr>
+      <p:sp>
+        <p:nvSpPr>
+          <p:cNvPr id="2" name="Title 1"/>
+          <p:cNvSpPr>
+            <a:spLocks noGrp="1"/>
+          </p:cNvSpPr>
+          <p:nvPr>
+            <p:ph type="title"/>
+          </p:nvPr>
+        </p:nvSpPr>
+        <p:spPr/>
+        <p:txBody>
+          <a:bodyPr/>
+          <a:lstStyle/>
+          <a:p>
+            <a:r>
+              <a:rPr lang="en-GB" dirty="0" smtClean="0"/>
+              <a:t>Coverage</a:t>
+            </a:r>
+            <a:endParaRPr lang="en-GB" dirty="0"/>
+          </a:p>
+        </p:txBody>
+      </p:sp>
+      <p:pic>
+        <p:nvPicPr>
+          <p:cNvPr id="4" name="Content Placeholder 3"/>
+          <p:cNvPicPr>
+            <a:picLocks noGrp="1" noChangeAspect="1"/>
+          </p:cNvPicPr>
+          <p:nvPr>
+            <p:ph idx="1"/>
+          </p:nvPr>
+        </p:nvPicPr>
+        <p:blipFill rotWithShape="1">
+          <a:blip r:embed="rId2"/>
+          <a:srcRect r="51932"/>
+          <a:stretch/>
+        </p:blipFill>
+        <p:spPr>
+          <a:xfrm>
+            <a:off x="713928" y="2786742"/>
+            <a:ext cx="7716143" cy="1523481"/>
+          </a:xfrm>
+          <a:prstGeom prst="rect">
+            <a:avLst/>
+          </a:prstGeom>
+        </p:spPr>
+      </p:pic>
+    </p:spTree>
+    <p:extLst>
+      <p:ext uri="{BB962C8B-B14F-4D97-AF65-F5344CB8AC3E}">
+        <p14:creationId xmlns:p14="http://schemas.microsoft.com/office/powerpoint/2010/main" val="1296190199"/>
+      </p:ext>
+    </p:extLst>
+  </p:cSld>
+  <p:clrMapOvr>
+    <a:masterClrMapping/>
+  </p:clrMapOvr>
+</p:sld>
+</file>
+
+<file path=ppt/slides/slide21.xml><?xml version="1.0" encoding="utf-8"?>
+<p:sld xmlns:a="http://schemas.openxmlformats.org/drawingml/2006/main" xmlns:r="http://schemas.openxmlformats.org/officeDocument/2006/relationships" xmlns:p="http://schemas.openxmlformats.org/presentationml/2006/main">
+  <p:cSld>
+    <p:spTree>
+      <p:nvGrpSpPr>
+        <p:cNvPr id="1" name=""/>
+        <p:cNvGrpSpPr/>
+        <p:nvPr/>
+      </p:nvGrpSpPr>
+      <p:grpSpPr>
+        <a:xfrm>
+          <a:off x="0" y="0"/>
+          <a:ext cx="0" cy="0"/>
+          <a:chOff x="0" y="0"/>
+          <a:chExt cx="0" cy="0"/>
+        </a:xfrm>
+      </p:grpSpPr>
+      <p:sp>
+        <p:nvSpPr>
+          <p:cNvPr id="2" name="Title 1"/>
+          <p:cNvSpPr>
+            <a:spLocks noGrp="1"/>
+          </p:cNvSpPr>
+          <p:nvPr>
+            <p:ph type="title"/>
+          </p:nvPr>
+        </p:nvSpPr>
+        <p:spPr/>
+        <p:txBody>
+          <a:bodyPr/>
+          <a:lstStyle/>
+          <a:p>
+            <a:r>
+              <a:rPr lang="en-GB" dirty="0" smtClean="0"/>
+              <a:t>Task Distribution</a:t>
+            </a:r>
+            <a:endParaRPr lang="en-GB" dirty="0"/>
+          </a:p>
+        </p:txBody>
+      </p:sp>
+      <p:graphicFrame>
+        <p:nvGraphicFramePr>
+          <p:cNvPr id="4" name="Content Placeholder 3"/>
+          <p:cNvGraphicFramePr>
+            <a:graphicFrameLocks noGrp="1"/>
+          </p:cNvGraphicFramePr>
+          <p:nvPr>
+            <p:ph idx="1"/>
+          </p:nvPr>
+        </p:nvGraphicFramePr>
+        <p:xfrm>
+          <a:off x="628650" y="1825625"/>
+          <a:ext cx="7886700" cy="2595880"/>
+        </p:xfrm>
+        <a:graphic>
+          <a:graphicData uri="http://schemas.openxmlformats.org/drawingml/2006/table">
+            <a:tbl>
+              <a:tblPr firstRow="1" bandRow="1">
+                <a:tableStyleId>{93296810-A885-4BE3-A3E7-6D5BEEA58F35}</a:tableStyleId>
+              </a:tblPr>
+              <a:tblGrid>
+                <a:gridCol w="2800350"/>
+                <a:gridCol w="1498600"/>
+                <a:gridCol w="3587750"/>
+              </a:tblGrid>
+              <a:tr h="370840">
+                <a:tc>
+                  <a:txBody>
+                    <a:bodyPr/>
+                    <a:lstStyle/>
+                    <a:p>
+                      <a:pPr algn="ctr"/>
+                      <a:r>
+                        <a:rPr lang="en-GB" dirty="0" smtClean="0"/>
+                        <a:t>Name</a:t>
+                      </a:r>
+                      <a:endParaRPr lang="en-GB" dirty="0"/>
+                    </a:p>
+                  </a:txBody>
+                  <a:tcPr/>
+                </a:tc>
+                <a:tc>
+                  <a:txBody>
+                    <a:bodyPr/>
+                    <a:lstStyle/>
+                    <a:p>
+                      <a:pPr algn="ctr"/>
+                      <a:r>
+                        <a:rPr lang="en-GB" dirty="0" smtClean="0"/>
+                        <a:t>SID</a:t>
+                      </a:r>
+                      <a:endParaRPr lang="en-GB" dirty="0"/>
+                    </a:p>
+                  </a:txBody>
+                  <a:tcPr/>
+                </a:tc>
+                <a:tc>
+                  <a:txBody>
+                    <a:bodyPr/>
+                    <a:lstStyle/>
+                    <a:p>
+                      <a:pPr algn="ctr"/>
+                      <a:r>
+                        <a:rPr lang="en-GB" dirty="0" smtClean="0"/>
+                        <a:t>Role</a:t>
+                      </a:r>
+                      <a:endParaRPr lang="en-GB" dirty="0"/>
+                    </a:p>
+                  </a:txBody>
+                  <a:tcPr/>
+                </a:tc>
+              </a:tr>
+              <a:tr h="370840">
+                <a:tc>
+                  <a:txBody>
+                    <a:bodyPr/>
+                    <a:lstStyle/>
+                    <a:p>
+                      <a:pPr marL="0" algn="l" defTabSz="914400" rtl="0" eaLnBrk="1" latinLnBrk="0" hangingPunct="1">
+                        <a:lnSpc>
+                          <a:spcPct val="107000"/>
+                        </a:lnSpc>
+                        <a:spcAft>
+                          <a:spcPts val="0"/>
+                        </a:spcAft>
+                      </a:pPr>
+                      <a:r>
+                        <a:rPr lang="en-GB" sz="2000" kern="1200" dirty="0"/>
+                        <a:t>CHAN </a:t>
+                      </a:r>
+                      <a:r>
+                        <a:rPr lang="en-GB" sz="2000" kern="1200" dirty="0" err="1"/>
+                        <a:t>Ho</a:t>
+                      </a:r>
+                      <a:r>
+                        <a:rPr lang="en-GB" sz="2000" kern="1200" dirty="0"/>
+                        <a:t> </a:t>
+                      </a:r>
+                      <a:r>
+                        <a:rPr lang="en-GB" sz="2000" kern="1200" dirty="0" smtClean="0"/>
+                        <a:t>Man</a:t>
+                      </a:r>
+                      <a:endParaRPr lang="en-GB" sz="2000" kern="1200" dirty="0">
+                        <a:solidFill>
+                          <a:schemeClr val="dk1"/>
+                        </a:solidFill>
+                        <a:latin typeface="+mn-lt"/>
+                        <a:ea typeface="+mn-ea"/>
+                        <a:cs typeface="+mn-cs"/>
+                      </a:endParaRPr>
+                    </a:p>
+                  </a:txBody>
+                  <a:tcPr marL="68580" marR="68580" marT="0" marB="0"/>
+                </a:tc>
+                <a:tc>
+                  <a:txBody>
+                    <a:bodyPr/>
+                    <a:lstStyle/>
+                    <a:p>
+                      <a:pPr marL="0" algn="l" defTabSz="914400" rtl="0" eaLnBrk="1" latinLnBrk="0" hangingPunct="1">
+                        <a:lnSpc>
+                          <a:spcPct val="107000"/>
+                        </a:lnSpc>
+                        <a:spcAft>
+                          <a:spcPts val="0"/>
+                        </a:spcAft>
+                      </a:pPr>
+                      <a:r>
+                        <a:rPr lang="en-GB" sz="2000" kern="1200" dirty="0" smtClean="0"/>
+                        <a:t>53078369</a:t>
+                      </a:r>
+                      <a:endParaRPr lang="en-GB" sz="2000" kern="1200" dirty="0">
+                        <a:solidFill>
+                          <a:schemeClr val="dk1"/>
+                        </a:solidFill>
+                        <a:latin typeface="+mn-lt"/>
+                        <a:ea typeface="+mn-ea"/>
+                        <a:cs typeface="+mn-cs"/>
+                      </a:endParaRPr>
+                    </a:p>
+                  </a:txBody>
+                  <a:tcPr marL="68580" marR="68580" marT="0" marB="0"/>
+                </a:tc>
+                <a:tc>
+                  <a:txBody>
+                    <a:bodyPr/>
+                    <a:lstStyle/>
+                    <a:p>
+                      <a:pPr marL="0" algn="l" defTabSz="914400" rtl="0" eaLnBrk="1" latinLnBrk="0" hangingPunct="1">
+                        <a:lnSpc>
+                          <a:spcPct val="107000"/>
+                        </a:lnSpc>
+                        <a:spcAft>
+                          <a:spcPts val="0"/>
+                        </a:spcAft>
+                      </a:pPr>
+                      <a:r>
+                        <a:rPr lang="en-GB" sz="2000" kern="1200" dirty="0"/>
+                        <a:t>Project </a:t>
+                      </a:r>
+                      <a:r>
+                        <a:rPr lang="en-GB" sz="2000" kern="1200" dirty="0" smtClean="0"/>
+                        <a:t>Manager</a:t>
+                      </a:r>
+                      <a:endParaRPr lang="en-GB" sz="2000" kern="1200" dirty="0">
+                        <a:solidFill>
+                          <a:schemeClr val="dk1"/>
+                        </a:solidFill>
+                        <a:latin typeface="+mn-lt"/>
+                        <a:ea typeface="+mn-ea"/>
+                        <a:cs typeface="+mn-cs"/>
+                      </a:endParaRPr>
+                    </a:p>
+                  </a:txBody>
+                  <a:tcPr marL="68580" marR="68580" marT="0" marB="0"/>
+                </a:tc>
+              </a:tr>
+              <a:tr h="370840">
+                <a:tc>
+                  <a:txBody>
+                    <a:bodyPr/>
+                    <a:lstStyle/>
+                    <a:p>
+                      <a:pPr marL="0" algn="l" defTabSz="914400" rtl="0" eaLnBrk="1" latinLnBrk="0" hangingPunct="1">
+                        <a:lnSpc>
+                          <a:spcPct val="107000"/>
+                        </a:lnSpc>
+                        <a:spcAft>
+                          <a:spcPts val="0"/>
+                        </a:spcAft>
+                      </a:pPr>
+                      <a:r>
+                        <a:rPr lang="en-GB" sz="2000" kern="1200" dirty="0"/>
+                        <a:t>CHEUK </a:t>
+                      </a:r>
+                      <a:r>
+                        <a:rPr lang="en-GB" sz="2000" kern="1200" dirty="0" err="1" smtClean="0"/>
+                        <a:t>Yik</a:t>
+                      </a:r>
+                      <a:r>
+                        <a:rPr lang="en-GB" sz="2000" kern="1200" baseline="0" dirty="0" smtClean="0"/>
+                        <a:t> Sum</a:t>
+                      </a:r>
+                      <a:endParaRPr lang="en-GB" sz="2000" kern="1200" dirty="0">
+                        <a:solidFill>
+                          <a:schemeClr val="dk1"/>
+                        </a:solidFill>
+                        <a:latin typeface="+mn-lt"/>
+                        <a:ea typeface="+mn-ea"/>
+                        <a:cs typeface="+mn-cs"/>
+                      </a:endParaRPr>
+                    </a:p>
+                  </a:txBody>
+                  <a:tcPr marL="68580" marR="68580" marT="0" marB="0"/>
+                </a:tc>
+                <a:tc>
+                  <a:txBody>
+                    <a:bodyPr/>
+                    <a:lstStyle/>
+                    <a:p>
+                      <a:pPr marL="0" algn="l" defTabSz="914400" rtl="0" eaLnBrk="1" latinLnBrk="0" hangingPunct="1">
+                        <a:lnSpc>
+                          <a:spcPct val="107000"/>
+                        </a:lnSpc>
+                        <a:spcAft>
+                          <a:spcPts val="0"/>
+                        </a:spcAft>
+                      </a:pPr>
+                      <a:r>
+                        <a:rPr lang="en-GB" sz="2000" kern="1200" dirty="0" smtClean="0"/>
+                        <a:t>53012319</a:t>
+                      </a:r>
+                      <a:endParaRPr lang="en-GB" sz="2000" kern="1200" dirty="0">
+                        <a:solidFill>
+                          <a:schemeClr val="dk1"/>
+                        </a:solidFill>
+                        <a:latin typeface="+mn-lt"/>
+                        <a:ea typeface="+mn-ea"/>
+                        <a:cs typeface="+mn-cs"/>
+                      </a:endParaRPr>
+                    </a:p>
+                  </a:txBody>
+                  <a:tcPr marL="68580" marR="68580" marT="0" marB="0"/>
+                </a:tc>
+                <a:tc>
+                  <a:txBody>
+                    <a:bodyPr/>
+                    <a:lstStyle/>
+                    <a:p>
+                      <a:pPr marL="0" algn="l" defTabSz="914400" rtl="0" eaLnBrk="1" latinLnBrk="0" hangingPunct="1">
+                        <a:lnSpc>
+                          <a:spcPct val="107000"/>
+                        </a:lnSpc>
+                        <a:spcAft>
+                          <a:spcPts val="0"/>
+                        </a:spcAft>
+                      </a:pPr>
+                      <a:r>
+                        <a:rPr lang="en-GB" sz="2000" kern="1200" dirty="0"/>
+                        <a:t>Assistant Project Manager</a:t>
+                      </a:r>
+                      <a:endParaRPr lang="en-GB" sz="2000" kern="1200" dirty="0">
+                        <a:solidFill>
+                          <a:schemeClr val="dk1"/>
+                        </a:solidFill>
+                        <a:latin typeface="+mn-lt"/>
+                        <a:ea typeface="+mn-ea"/>
+                        <a:cs typeface="+mn-cs"/>
+                      </a:endParaRPr>
+                    </a:p>
+                  </a:txBody>
+                  <a:tcPr marL="68580" marR="68580" marT="0" marB="0"/>
+                </a:tc>
+              </a:tr>
+              <a:tr h="370840">
+                <a:tc>
+                  <a:txBody>
+                    <a:bodyPr/>
+                    <a:lstStyle/>
+                    <a:p>
+                      <a:pPr marL="0" algn="l" defTabSz="914400" rtl="0" eaLnBrk="1" latinLnBrk="0" hangingPunct="1">
+                        <a:lnSpc>
+                          <a:spcPct val="107000"/>
+                        </a:lnSpc>
+                        <a:spcAft>
+                          <a:spcPts val="0"/>
+                        </a:spcAft>
+                      </a:pPr>
+                      <a:r>
+                        <a:rPr lang="en-GB" sz="2000" kern="1200" dirty="0"/>
+                        <a:t>CHAN </a:t>
+                      </a:r>
+                      <a:r>
+                        <a:rPr lang="en-GB" sz="2000" kern="1200" dirty="0" err="1"/>
+                        <a:t>Ho</a:t>
+                      </a:r>
+                      <a:r>
+                        <a:rPr lang="en-GB" sz="2000" kern="1200" dirty="0"/>
+                        <a:t> </a:t>
+                      </a:r>
+                      <a:r>
+                        <a:rPr lang="en-GB" sz="2000" kern="1200" dirty="0" smtClean="0"/>
+                        <a:t>Man</a:t>
+                      </a:r>
+                      <a:endParaRPr lang="en-GB" sz="2000" kern="1200" dirty="0">
+                        <a:solidFill>
+                          <a:schemeClr val="dk1"/>
+                        </a:solidFill>
+                        <a:latin typeface="+mn-lt"/>
+                        <a:ea typeface="+mn-ea"/>
+                        <a:cs typeface="+mn-cs"/>
+                      </a:endParaRPr>
+                    </a:p>
+                  </a:txBody>
+                  <a:tcPr marL="68580" marR="68580" marT="0" marB="0"/>
+                </a:tc>
+                <a:tc>
+                  <a:txBody>
+                    <a:bodyPr/>
+                    <a:lstStyle/>
+                    <a:p>
+                      <a:pPr marL="0" algn="l" defTabSz="914400" rtl="0" eaLnBrk="1" latinLnBrk="0" hangingPunct="1">
+                        <a:lnSpc>
+                          <a:spcPct val="107000"/>
+                        </a:lnSpc>
+                        <a:spcAft>
+                          <a:spcPts val="0"/>
+                        </a:spcAft>
+                      </a:pPr>
+                      <a:r>
+                        <a:rPr lang="en-GB" sz="2000" kern="1200" dirty="0" smtClean="0"/>
+                        <a:t>53091240</a:t>
+                      </a:r>
+                      <a:endParaRPr lang="en-GB" sz="2000" kern="1200" dirty="0">
+                        <a:solidFill>
+                          <a:schemeClr val="dk1"/>
+                        </a:solidFill>
+                        <a:latin typeface="+mn-lt"/>
+                        <a:ea typeface="+mn-ea"/>
+                        <a:cs typeface="+mn-cs"/>
+                      </a:endParaRPr>
+                    </a:p>
+                  </a:txBody>
+                  <a:tcPr marL="68580" marR="68580" marT="0" marB="0"/>
+                </a:tc>
+                <a:tc>
+                  <a:txBody>
+                    <a:bodyPr/>
+                    <a:lstStyle/>
+                    <a:p>
+                      <a:pPr marL="0" algn="l" defTabSz="914400" rtl="0" eaLnBrk="1" latinLnBrk="0" hangingPunct="1">
+                        <a:lnSpc>
+                          <a:spcPct val="107000"/>
+                        </a:lnSpc>
+                        <a:spcAft>
+                          <a:spcPts val="0"/>
+                        </a:spcAft>
+                      </a:pPr>
+                      <a:r>
+                        <a:rPr lang="en-GB" sz="2000" kern="1200" dirty="0"/>
+                        <a:t>Scrum Master</a:t>
+                      </a:r>
+                      <a:endParaRPr lang="en-GB" sz="2000" kern="1200" dirty="0">
+                        <a:solidFill>
+                          <a:schemeClr val="dk1"/>
+                        </a:solidFill>
+                        <a:latin typeface="+mn-lt"/>
+                        <a:ea typeface="+mn-ea"/>
+                        <a:cs typeface="+mn-cs"/>
+                      </a:endParaRPr>
+                    </a:p>
+                  </a:txBody>
+                  <a:tcPr marL="68580" marR="68580" marT="0" marB="0"/>
+                </a:tc>
+              </a:tr>
+              <a:tr h="370840">
+                <a:tc>
+                  <a:txBody>
+                    <a:bodyPr/>
+                    <a:lstStyle/>
+                    <a:p>
+                      <a:pPr marL="0" algn="l" defTabSz="914400" rtl="0" eaLnBrk="1" latinLnBrk="0" hangingPunct="1">
+                        <a:lnSpc>
+                          <a:spcPct val="107000"/>
+                        </a:lnSpc>
+                        <a:spcAft>
+                          <a:spcPts val="0"/>
+                        </a:spcAft>
+                      </a:pPr>
+                      <a:r>
+                        <a:rPr lang="en-GB" sz="2000" kern="1200" dirty="0"/>
+                        <a:t>LEE Man </a:t>
+                      </a:r>
+                      <a:r>
+                        <a:rPr lang="en-GB" sz="2000" kern="1200" dirty="0" smtClean="0"/>
+                        <a:t>To</a:t>
+                      </a:r>
+                      <a:endParaRPr lang="en-GB" sz="2000" kern="1200" dirty="0">
+                        <a:solidFill>
+                          <a:schemeClr val="dk1"/>
+                        </a:solidFill>
+                        <a:latin typeface="+mn-lt"/>
+                        <a:ea typeface="+mn-ea"/>
+                        <a:cs typeface="+mn-cs"/>
+                      </a:endParaRPr>
+                    </a:p>
+                  </a:txBody>
+                  <a:tcPr marL="68580" marR="68580" marT="0" marB="0"/>
+                </a:tc>
+                <a:tc>
+                  <a:txBody>
+                    <a:bodyPr/>
+                    <a:lstStyle/>
+                    <a:p>
+                      <a:pPr marL="0" algn="l" defTabSz="914400" rtl="0" eaLnBrk="1" latinLnBrk="0" hangingPunct="1">
+                        <a:lnSpc>
+                          <a:spcPct val="107000"/>
+                        </a:lnSpc>
+                        <a:spcAft>
+                          <a:spcPts val="0"/>
+                        </a:spcAft>
+                      </a:pPr>
+                      <a:r>
+                        <a:rPr lang="en-GB" sz="2000" kern="1200" dirty="0" smtClean="0"/>
+                        <a:t>53075299</a:t>
+                      </a:r>
+                      <a:endParaRPr lang="en-GB" sz="2000" kern="1200" dirty="0">
+                        <a:solidFill>
+                          <a:schemeClr val="dk1"/>
+                        </a:solidFill>
+                        <a:latin typeface="+mn-lt"/>
+                        <a:ea typeface="+mn-ea"/>
+                        <a:cs typeface="+mn-cs"/>
+                      </a:endParaRPr>
+                    </a:p>
+                  </a:txBody>
+                  <a:tcPr marL="68580" marR="68580" marT="0" marB="0"/>
+                </a:tc>
+                <a:tc>
+                  <a:txBody>
+                    <a:bodyPr/>
+                    <a:lstStyle/>
+                    <a:p>
+                      <a:pPr marL="0" algn="l" defTabSz="914400" rtl="0" eaLnBrk="1" latinLnBrk="0" hangingPunct="1">
+                        <a:lnSpc>
+                          <a:spcPct val="107000"/>
+                        </a:lnSpc>
+                        <a:spcAft>
+                          <a:spcPts val="0"/>
+                        </a:spcAft>
+                      </a:pPr>
+                      <a:r>
+                        <a:rPr lang="en-GB" sz="2000" kern="1200" dirty="0"/>
+                        <a:t>Pair Programmer</a:t>
+                      </a:r>
+                      <a:endParaRPr lang="en-GB" sz="2000" kern="1200" dirty="0">
+                        <a:solidFill>
+                          <a:schemeClr val="dk1"/>
+                        </a:solidFill>
+                        <a:latin typeface="+mn-lt"/>
+                        <a:ea typeface="+mn-ea"/>
+                        <a:cs typeface="+mn-cs"/>
+                      </a:endParaRPr>
+                    </a:p>
+                  </a:txBody>
+                  <a:tcPr marL="68580" marR="68580" marT="0" marB="0"/>
+                </a:tc>
+              </a:tr>
+              <a:tr h="370840">
+                <a:tc>
+                  <a:txBody>
+                    <a:bodyPr/>
+                    <a:lstStyle/>
+                    <a:p>
+                      <a:pPr marL="0" algn="l" defTabSz="914400" rtl="0" eaLnBrk="1" latinLnBrk="0" hangingPunct="1">
+                        <a:lnSpc>
+                          <a:spcPct val="107000"/>
+                        </a:lnSpc>
+                        <a:spcAft>
+                          <a:spcPts val="0"/>
+                        </a:spcAft>
+                      </a:pPr>
+                      <a:r>
+                        <a:rPr lang="en-GB" sz="2000" kern="1200" dirty="0"/>
+                        <a:t>HO Sui </a:t>
+                      </a:r>
+                      <a:r>
+                        <a:rPr lang="en-GB" sz="2000" kern="1200" dirty="0" smtClean="0"/>
+                        <a:t>Cheong</a:t>
+                      </a:r>
+                      <a:r>
+                        <a:rPr lang="en-GB" sz="2000" kern="1200" baseline="0" dirty="0" smtClean="0"/>
+                        <a:t> Jonathan</a:t>
+                      </a:r>
+                      <a:endParaRPr lang="en-GB" sz="2000" kern="1200" dirty="0">
+                        <a:solidFill>
+                          <a:schemeClr val="dk1"/>
+                        </a:solidFill>
+                        <a:latin typeface="+mn-lt"/>
+                        <a:ea typeface="+mn-ea"/>
+                        <a:cs typeface="+mn-cs"/>
+                      </a:endParaRPr>
+                    </a:p>
+                  </a:txBody>
+                  <a:tcPr marL="68580" marR="68580" marT="0" marB="0"/>
+                </a:tc>
+                <a:tc>
+                  <a:txBody>
+                    <a:bodyPr/>
+                    <a:lstStyle/>
+                    <a:p>
+                      <a:pPr marL="0" algn="l" defTabSz="914400" rtl="0" eaLnBrk="1" latinLnBrk="0" hangingPunct="1">
+                        <a:lnSpc>
+                          <a:spcPct val="107000"/>
+                        </a:lnSpc>
+                        <a:spcAft>
+                          <a:spcPts val="0"/>
+                        </a:spcAft>
+                      </a:pPr>
+                      <a:r>
+                        <a:rPr lang="en-GB" sz="2000" kern="1200" dirty="0" smtClean="0"/>
+                        <a:t>53117178</a:t>
+                      </a:r>
+                      <a:endParaRPr lang="en-GB" sz="2000" kern="1200" dirty="0">
+                        <a:solidFill>
+                          <a:schemeClr val="dk1"/>
+                        </a:solidFill>
+                        <a:latin typeface="+mn-lt"/>
+                        <a:ea typeface="+mn-ea"/>
+                        <a:cs typeface="+mn-cs"/>
+                      </a:endParaRPr>
+                    </a:p>
+                  </a:txBody>
+                  <a:tcPr marL="68580" marR="68580" marT="0" marB="0"/>
+                </a:tc>
+                <a:tc>
+                  <a:txBody>
+                    <a:bodyPr/>
+                    <a:lstStyle/>
+                    <a:p>
+                      <a:pPr marL="0" algn="l" defTabSz="914400" rtl="0" eaLnBrk="1" latinLnBrk="0" hangingPunct="1">
+                        <a:lnSpc>
+                          <a:spcPct val="107000"/>
+                        </a:lnSpc>
+                        <a:spcAft>
+                          <a:spcPts val="0"/>
+                        </a:spcAft>
+                      </a:pPr>
+                      <a:r>
+                        <a:rPr lang="en-GB" sz="2000" kern="1200" dirty="0"/>
+                        <a:t>Pair Programmer</a:t>
+                      </a:r>
+                      <a:endParaRPr lang="en-GB" sz="2000" kern="1200" dirty="0">
+                        <a:solidFill>
+                          <a:schemeClr val="dk1"/>
+                        </a:solidFill>
+                        <a:latin typeface="+mn-lt"/>
+                        <a:ea typeface="+mn-ea"/>
+                        <a:cs typeface="+mn-cs"/>
+                      </a:endParaRPr>
+                    </a:p>
+                  </a:txBody>
+                  <a:tcPr marL="68580" marR="68580" marT="0" marB="0"/>
+                </a:tc>
+              </a:tr>
+              <a:tr h="370840">
+                <a:tc>
+                  <a:txBody>
+                    <a:bodyPr/>
+                    <a:lstStyle/>
+                    <a:p>
+                      <a:pPr algn="l">
+                        <a:lnSpc>
+                          <a:spcPct val="107000"/>
+                        </a:lnSpc>
+                        <a:spcAft>
+                          <a:spcPts val="0"/>
+                        </a:spcAft>
+                      </a:pPr>
+                      <a:r>
+                        <a:rPr lang="en-GB" sz="2000" kern="1200" dirty="0"/>
+                        <a:t>CHEUNG Chi </a:t>
+                      </a:r>
+                      <a:r>
+                        <a:rPr lang="en-GB" sz="2000" kern="1200" dirty="0" smtClean="0"/>
+                        <a:t>Ngai</a:t>
+                      </a:r>
+                      <a:endParaRPr lang="en-GB" sz="2000" kern="1200" dirty="0">
+                        <a:solidFill>
+                          <a:schemeClr val="dk1"/>
+                        </a:solidFill>
+                        <a:latin typeface="+mn-lt"/>
+                        <a:ea typeface="+mn-ea"/>
+                        <a:cs typeface="+mn-cs"/>
+                      </a:endParaRPr>
+                    </a:p>
+                  </a:txBody>
+                  <a:tcPr marL="68580" marR="68580" marT="0" marB="0"/>
+                </a:tc>
+                <a:tc>
+                  <a:txBody>
+                    <a:bodyPr/>
+                    <a:lstStyle/>
+                    <a:p>
+                      <a:pPr algn="l">
+                        <a:lnSpc>
+                          <a:spcPct val="107000"/>
+                        </a:lnSpc>
+                        <a:spcAft>
+                          <a:spcPts val="0"/>
+                        </a:spcAft>
+                      </a:pPr>
+                      <a:r>
+                        <a:rPr lang="en-GB" sz="2000" kern="1200" dirty="0" smtClean="0"/>
+                        <a:t>53013494</a:t>
+                      </a:r>
+                      <a:endParaRPr lang="en-GB" sz="2000" kern="1200" dirty="0">
+                        <a:solidFill>
+                          <a:schemeClr val="dk1"/>
+                        </a:solidFill>
+                        <a:latin typeface="+mn-lt"/>
+                        <a:ea typeface="+mn-ea"/>
+                        <a:cs typeface="+mn-cs"/>
+                      </a:endParaRPr>
+                    </a:p>
+                  </a:txBody>
+                  <a:tcPr marL="68580" marR="68580" marT="0" marB="0"/>
+                </a:tc>
+                <a:tc>
+                  <a:txBody>
+                    <a:bodyPr/>
+                    <a:lstStyle/>
+                    <a:p>
+                      <a:pPr marL="0" marR="0" indent="0" algn="l" defTabSz="914400" rtl="0" eaLnBrk="1" fontAlgn="auto" latinLnBrk="0" hangingPunct="1">
+                        <a:lnSpc>
+                          <a:spcPct val="107000"/>
+                        </a:lnSpc>
+                        <a:spcBef>
+                          <a:spcPts val="0"/>
+                        </a:spcBef>
+                        <a:spcAft>
+                          <a:spcPts val="0"/>
+                        </a:spcAft>
+                        <a:buClrTx/>
+                        <a:buSzTx/>
+                        <a:buFontTx/>
+                        <a:buNone/>
+                        <a:tabLst/>
+                        <a:defRPr/>
+                      </a:pPr>
+                      <a:r>
+                        <a:rPr lang="en-GB" sz="2000" kern="1200" dirty="0" smtClean="0"/>
+                        <a:t>Pair Programmer</a:t>
+                      </a:r>
+                      <a:endParaRPr lang="en-GB" sz="2000" kern="1200" dirty="0" smtClean="0">
+                        <a:solidFill>
+                          <a:schemeClr val="dk1"/>
+                        </a:solidFill>
+                        <a:latin typeface="+mn-lt"/>
+                        <a:ea typeface="+mn-ea"/>
+                        <a:cs typeface="+mn-cs"/>
+                      </a:endParaRPr>
+                    </a:p>
+                  </a:txBody>
+                  <a:tcPr marL="68580" marR="68580" marT="0" marB="0"/>
+                </a:tc>
+              </a:tr>
+            </a:tbl>
+          </a:graphicData>
+        </a:graphic>
+      </p:graphicFrame>
+    </p:spTree>
+    <p:extLst>
+      <p:ext uri="{BB962C8B-B14F-4D97-AF65-F5344CB8AC3E}">
+        <p14:creationId xmlns:p14="http://schemas.microsoft.com/office/powerpoint/2010/main" val="1695449675"/>
+      </p:ext>
+    </p:extLst>
+  </p:cSld>
+  <p:clrMapOvr>
+    <a:masterClrMapping/>
+  </p:clrMapOvr>
+</p:sld>
+</file>
+
+<file path=ppt/slides/slide22.xml><?xml version="1.0" encoding="utf-8"?>
+<p:sld xmlns:a="http://schemas.openxmlformats.org/drawingml/2006/main" xmlns:r="http://schemas.openxmlformats.org/officeDocument/2006/relationships" xmlns:p="http://schemas.openxmlformats.org/presentationml/2006/main">
+  <p:cSld>
+    <p:spTree>
+      <p:nvGrpSpPr>
+        <p:cNvPr id="1" name=""/>
+        <p:cNvGrpSpPr/>
+        <p:nvPr/>
+      </p:nvGrpSpPr>
+      <p:grpSpPr>
+        <a:xfrm>
+          <a:off x="0" y="0"/>
+          <a:ext cx="0" cy="0"/>
+          <a:chOff x="0" y="0"/>
+          <a:chExt cx="0" cy="0"/>
+        </a:xfrm>
+      </p:grpSpPr>
+      <p:sp>
+        <p:nvSpPr>
+          <p:cNvPr id="2" name="Title 1"/>
+          <p:cNvSpPr>
+            <a:spLocks noGrp="1"/>
+          </p:cNvSpPr>
+          <p:nvPr>
+            <p:ph type="title"/>
+          </p:nvPr>
+        </p:nvSpPr>
+        <p:spPr/>
+        <p:txBody>
+          <a:bodyPr/>
+          <a:lstStyle/>
+          <a:p>
+            <a:endParaRPr lang="en-GB" dirty="0"/>
+          </a:p>
+        </p:txBody>
+      </p:sp>
+      <p:sp>
+        <p:nvSpPr>
+          <p:cNvPr id="3" name="Content Placeholder 2"/>
+          <p:cNvSpPr>
+            <a:spLocks noGrp="1"/>
+          </p:cNvSpPr>
+          <p:nvPr>
+            <p:ph idx="1"/>
+          </p:nvPr>
+        </p:nvSpPr>
+        <p:spPr/>
+        <p:txBody>
+          <a:bodyPr>
+            <a:normAutofit/>
+          </a:bodyPr>
+          <a:lstStyle/>
+          <a:p>
+            <a:pPr marL="0" indent="0" algn="ctr">
+              <a:buNone/>
+            </a:pPr>
+            <a:r>
+              <a:rPr lang="en-GB" sz="9600" dirty="0" smtClean="0"/>
+              <a:t>END</a:t>
+            </a:r>
+            <a:endParaRPr lang="en-GB" sz="9600" dirty="0"/>
+          </a:p>
+        </p:txBody>
+      </p:sp>
+    </p:spTree>
+    <p:extLst>
+      <p:ext uri="{BB962C8B-B14F-4D97-AF65-F5344CB8AC3E}">
+        <p14:creationId xmlns:p14="http://schemas.microsoft.com/office/powerpoint/2010/main" val="2717374387"/>
+      </p:ext>
+    </p:extLst>
+  </p:cSld>
+  <p:clrMapOvr>
+    <a:masterClrMapping/>
+  </p:clrMapOvr>
+</p:sld>
+</file>
+
 <file path=ppt/slides/slide3.xml><?xml version="1.0" encoding="utf-8"?>
 <p:sld xmlns:a="http://schemas.openxmlformats.org/drawingml/2006/main" xmlns:r="http://schemas.openxmlformats.org/officeDocument/2006/relationships" xmlns:p="http://schemas.openxmlformats.org/presentationml/2006/main">
   <p:cSld>
@@ -19559,138 +20433,410 @@
       </p:sp>
       <p:graphicFrame>
         <p:nvGraphicFramePr>
-          <p:cNvPr id="4" name="Content Placeholder 3"/>
+          <p:cNvPr id="5" name="Content Placeholder 3"/>
           <p:cNvGraphicFramePr>
-            <a:graphicFrameLocks noGrp="1"/>
+            <a:graphicFrameLocks/>
           </p:cNvGraphicFramePr>
           <p:nvPr>
-            <p:ph idx="1"/>
             <p:extLst>
               <p:ext uri="{D42A27DB-BD31-4B8C-83A1-F6EECF244321}">
-                <p14:modId xmlns:p14="http://schemas.microsoft.com/office/powerpoint/2010/main" val="895700761"/>
+                <p14:modId xmlns:p14="http://schemas.microsoft.com/office/powerpoint/2010/main" val="295775078"/>
               </p:ext>
             </p:extLst>
           </p:nvPr>
         </p:nvGraphicFramePr>
         <p:xfrm>
-          <a:off x="628650" y="1955799"/>
-          <a:ext cx="7409535" cy="525100"/>
+          <a:off x="628650" y="1825625"/>
+          <a:ext cx="7886700" cy="1854200"/>
         </p:xfrm>
         <a:graphic>
           <a:graphicData uri="http://schemas.openxmlformats.org/drawingml/2006/table">
             <a:tbl>
               <a:tblPr firstRow="1" bandRow="1">
-                <a:tableStyleId>{5C22544A-7EE6-4342-B048-85BDC9FD1C3A}</a:tableStyleId>
+                <a:tableStyleId>{21E4AEA4-8DFA-4A89-87EB-49C32662AFE0}</a:tableStyleId>
               </a:tblPr>
               <a:tblGrid>
-                <a:gridCol w="1481907"/>
-                <a:gridCol w="1481907"/>
-                <a:gridCol w="1481907"/>
-                <a:gridCol w="1481907"/>
-                <a:gridCol w="1481907"/>
+                <a:gridCol w="971550"/>
+                <a:gridCol w="673100"/>
+                <a:gridCol w="2102757"/>
+                <a:gridCol w="2100943"/>
+                <a:gridCol w="2038350"/>
               </a:tblGrid>
-              <a:tr h="261303">
+              <a:tr h="370840">
                 <a:tc>
                   <a:txBody>
                     <a:bodyPr/>
                     <a:lstStyle/>
                     <a:p>
-                      <a:endParaRPr lang="en-GB" sz="1300" dirty="0"/>
+                      <a:pPr algn="ctr"/>
+                      <a:r>
+                        <a:rPr lang="en-GB" dirty="0" smtClean="0"/>
+                        <a:t>Course</a:t>
+                      </a:r>
+                      <a:endParaRPr lang="en-GB" dirty="0"/>
                     </a:p>
                   </a:txBody>
-                  <a:tcPr marL="64431" marR="64431" marT="32215" marB="32215"/>
+                  <a:tcPr/>
                 </a:tc>
                 <a:tc>
                   <a:txBody>
                     <a:bodyPr/>
                     <a:lstStyle/>
                     <a:p>
-                      <a:endParaRPr lang="en-GB" sz="1300"/>
+                      <a:pPr algn="ctr"/>
+                      <a:r>
+                        <a:rPr lang="en-GB" dirty="0" smtClean="0"/>
+                        <a:t>Core</a:t>
+                      </a:r>
+                      <a:endParaRPr lang="en-GB" dirty="0"/>
                     </a:p>
                   </a:txBody>
-                  <a:tcPr marL="64431" marR="64431" marT="32215" marB="32215"/>
+                  <a:tcPr/>
                 </a:tc>
                 <a:tc>
                   <a:txBody>
                     <a:bodyPr/>
                     <a:lstStyle/>
                     <a:p>
-                      <a:endParaRPr lang="en-GB" sz="1300"/>
+                      <a:pPr algn="ctr"/>
+                      <a:r>
+                        <a:rPr lang="en-GB" dirty="0" err="1" smtClean="0"/>
+                        <a:t>Lec</a:t>
+                      </a:r>
+                      <a:endParaRPr lang="en-GB" dirty="0"/>
                     </a:p>
                   </a:txBody>
-                  <a:tcPr marL="64431" marR="64431" marT="32215" marB="32215"/>
+                  <a:tcPr/>
                 </a:tc>
                 <a:tc>
                   <a:txBody>
                     <a:bodyPr/>
                     <a:lstStyle/>
                     <a:p>
-                      <a:endParaRPr lang="en-GB" sz="1300"/>
+                      <a:pPr algn="ctr"/>
+                      <a:r>
+                        <a:rPr lang="en-GB" dirty="0" smtClean="0"/>
+                        <a:t>Tut 1</a:t>
+                      </a:r>
+                      <a:endParaRPr lang="en-GB" dirty="0"/>
                     </a:p>
                   </a:txBody>
-                  <a:tcPr marL="64431" marR="64431" marT="32215" marB="32215"/>
+                  <a:tcPr/>
                 </a:tc>
                 <a:tc>
                   <a:txBody>
                     <a:bodyPr/>
                     <a:lstStyle/>
                     <a:p>
-                      <a:endParaRPr lang="en-GB" sz="1300"/>
+                      <a:pPr algn="ctr"/>
+                      <a:r>
+                        <a:rPr lang="en-GB" dirty="0" smtClean="0"/>
+                        <a:t>Tut 2</a:t>
+                      </a:r>
+                      <a:endParaRPr lang="en-GB" dirty="0"/>
                     </a:p>
                   </a:txBody>
-                  <a:tcPr marL="64431" marR="64431" marT="32215" marB="32215"/>
+                  <a:tcPr/>
                 </a:tc>
               </a:tr>
-              <a:tr h="261303">
+              <a:tr h="370840">
                 <a:tc>
                   <a:txBody>
                     <a:bodyPr/>
                     <a:lstStyle/>
                     <a:p>
-                      <a:endParaRPr lang="en-GB" sz="1300" dirty="0"/>
+                      <a:r>
+                        <a:rPr lang="en-GB" dirty="0" smtClean="0"/>
+                        <a:t>CS4182</a:t>
+                      </a:r>
+                      <a:endParaRPr lang="en-GB" dirty="0"/>
                     </a:p>
                   </a:txBody>
-                  <a:tcPr marL="64431" marR="64431" marT="32215" marB="32215"/>
+                  <a:tcPr/>
                 </a:tc>
                 <a:tc>
                   <a:txBody>
                     <a:bodyPr/>
                     <a:lstStyle/>
                     <a:p>
-                      <a:endParaRPr lang="en-GB" sz="1300"/>
+                      <a:r>
+                        <a:rPr lang="en-GB" dirty="0" smtClean="0"/>
+                        <a:t>Yes</a:t>
+                      </a:r>
+                      <a:endParaRPr lang="en-GB" dirty="0"/>
                     </a:p>
                   </a:txBody>
-                  <a:tcPr marL="64431" marR="64431" marT="32215" marB="32215"/>
+                  <a:tcPr/>
                 </a:tc>
                 <a:tc>
                   <a:txBody>
                     <a:bodyPr/>
                     <a:lstStyle/>
                     <a:p>
-                      <a:endParaRPr lang="en-GB" sz="1300"/>
+                      <a:r>
+                        <a:rPr lang="en-GB" dirty="0" smtClean="0"/>
+                        <a:t>Sat 11-13</a:t>
+                      </a:r>
+                      <a:endParaRPr lang="en-GB" dirty="0"/>
                     </a:p>
                   </a:txBody>
-                  <a:tcPr marL="64431" marR="64431" marT="32215" marB="32215"/>
+                  <a:tcPr/>
                 </a:tc>
                 <a:tc>
                   <a:txBody>
                     <a:bodyPr/>
                     <a:lstStyle/>
                     <a:p>
-                      <a:endParaRPr lang="en-GB" sz="1300"/>
+                      <a:r>
+                        <a:rPr lang="en-GB" dirty="0" smtClean="0"/>
+                        <a:t>Tue</a:t>
+                      </a:r>
+                      <a:r>
+                        <a:rPr lang="en-GB" baseline="0" dirty="0" smtClean="0"/>
+                        <a:t> 13-15</a:t>
+                      </a:r>
+                      <a:endParaRPr lang="en-GB" dirty="0"/>
                     </a:p>
                   </a:txBody>
-                  <a:tcPr marL="64431" marR="64431" marT="32215" marB="32215"/>
+                  <a:tcPr/>
                 </a:tc>
                 <a:tc>
                   <a:txBody>
                     <a:bodyPr/>
                     <a:lstStyle/>
                     <a:p>
-                      <a:endParaRPr lang="en-GB" sz="1300" dirty="0"/>
+                      <a:endParaRPr lang="en-GB" dirty="0"/>
                     </a:p>
                   </a:txBody>
-                  <a:tcPr marL="64431" marR="64431" marT="32215" marB="32215"/>
+                  <a:tcPr/>
+                </a:tc>
+              </a:tr>
+              <a:tr h="370840">
+                <a:tc>
+                  <a:txBody>
+                    <a:bodyPr/>
+                    <a:lstStyle/>
+                    <a:p>
+                      <a:r>
+                        <a:rPr lang="en-GB" dirty="0" smtClean="0"/>
+                        <a:t>CS4280</a:t>
+                      </a:r>
+                      <a:endParaRPr lang="en-GB" dirty="0"/>
+                    </a:p>
+                  </a:txBody>
+                  <a:tcPr/>
+                </a:tc>
+                <a:tc>
+                  <a:txBody>
+                    <a:bodyPr/>
+                    <a:lstStyle/>
+                    <a:p>
+                      <a:r>
+                        <a:rPr lang="en-GB" dirty="0" smtClean="0"/>
+                        <a:t>No</a:t>
+                      </a:r>
+                      <a:endParaRPr lang="en-GB" dirty="0"/>
+                    </a:p>
+                  </a:txBody>
+                  <a:tcPr/>
+                </a:tc>
+                <a:tc>
+                  <a:txBody>
+                    <a:bodyPr/>
+                    <a:lstStyle/>
+                    <a:p>
+                      <a:r>
+                        <a:rPr lang="en-GB" dirty="0" smtClean="0"/>
+                        <a:t>Fri</a:t>
+                      </a:r>
+                      <a:r>
+                        <a:rPr lang="en-GB" baseline="0" dirty="0" smtClean="0"/>
+                        <a:t> 9-11</a:t>
+                      </a:r>
+                      <a:endParaRPr lang="en-GB" dirty="0"/>
+                    </a:p>
+                  </a:txBody>
+                  <a:tcPr/>
+                </a:tc>
+                <a:tc>
+                  <a:txBody>
+                    <a:bodyPr/>
+                    <a:lstStyle/>
+                    <a:p>
+                      <a:r>
+                        <a:rPr lang="en-GB" dirty="0" smtClean="0"/>
+                        <a:t>Fri 11-12</a:t>
+                      </a:r>
+                      <a:endParaRPr lang="en-GB" dirty="0"/>
+                    </a:p>
+                  </a:txBody>
+                  <a:tcPr/>
+                </a:tc>
+                <a:tc>
+                  <a:txBody>
+                    <a:bodyPr/>
+                    <a:lstStyle/>
+                    <a:p>
+                      <a:endParaRPr lang="en-GB" dirty="0"/>
+                    </a:p>
+                  </a:txBody>
+                  <a:tcPr/>
+                </a:tc>
+              </a:tr>
+              <a:tr h="370840">
+                <a:tc>
+                  <a:txBody>
+                    <a:bodyPr/>
+                    <a:lstStyle/>
+                    <a:p>
+                      <a:r>
+                        <a:rPr lang="en-GB" dirty="0" smtClean="0"/>
+                        <a:t>CS4284</a:t>
+                      </a:r>
+                      <a:endParaRPr lang="en-GB" dirty="0"/>
+                    </a:p>
+                  </a:txBody>
+                  <a:tcPr/>
+                </a:tc>
+                <a:tc>
+                  <a:txBody>
+                    <a:bodyPr/>
+                    <a:lstStyle/>
+                    <a:p>
+                      <a:r>
+                        <a:rPr lang="en-GB" dirty="0" smtClean="0"/>
+                        <a:t>No</a:t>
+                      </a:r>
+                      <a:endParaRPr lang="en-GB" dirty="0"/>
+                    </a:p>
+                  </a:txBody>
+                  <a:tcPr/>
+                </a:tc>
+                <a:tc>
+                  <a:txBody>
+                    <a:bodyPr/>
+                    <a:lstStyle/>
+                    <a:p>
+                      <a:pPr marL="0" marR="0" indent="0" algn="l" defTabSz="914400" rtl="0" eaLnBrk="1" fontAlgn="auto" latinLnBrk="0" hangingPunct="1">
+                        <a:lnSpc>
+                          <a:spcPct val="100000"/>
+                        </a:lnSpc>
+                        <a:spcBef>
+                          <a:spcPts val="0"/>
+                        </a:spcBef>
+                        <a:spcAft>
+                          <a:spcPts val="0"/>
+                        </a:spcAft>
+                        <a:buClrTx/>
+                        <a:buSzTx/>
+                        <a:buFontTx/>
+                        <a:buNone/>
+                        <a:tabLst/>
+                        <a:defRPr/>
+                      </a:pPr>
+                      <a:r>
+                        <a:rPr lang="en-GB" dirty="0" smtClean="0"/>
+                        <a:t>Sat 11-13</a:t>
+                      </a:r>
+                    </a:p>
+                  </a:txBody>
+                  <a:tcPr/>
+                </a:tc>
+                <a:tc>
+                  <a:txBody>
+                    <a:bodyPr/>
+                    <a:lstStyle/>
+                    <a:p>
+                      <a:r>
+                        <a:rPr lang="en-GB" dirty="0" smtClean="0"/>
+                        <a:t>Mon 15-16</a:t>
+                      </a:r>
+                      <a:endParaRPr lang="en-GB" dirty="0"/>
+                    </a:p>
+                  </a:txBody>
+                  <a:tcPr/>
+                </a:tc>
+                <a:tc>
+                  <a:txBody>
+                    <a:bodyPr/>
+                    <a:lstStyle/>
+                    <a:p>
+                      <a:endParaRPr lang="en-GB" dirty="0"/>
+                    </a:p>
+                  </a:txBody>
+                  <a:tcPr/>
+                </a:tc>
+              </a:tr>
+              <a:tr h="370840">
+                <a:tc>
+                  <a:txBody>
+                    <a:bodyPr/>
+                    <a:lstStyle/>
+                    <a:p>
+                      <a:r>
+                        <a:rPr lang="en-GB" dirty="0" smtClean="0"/>
+                        <a:t>CS4285</a:t>
+                      </a:r>
+                      <a:endParaRPr lang="en-GB" dirty="0"/>
+                    </a:p>
+                  </a:txBody>
+                  <a:tcPr/>
+                </a:tc>
+                <a:tc>
+                  <a:txBody>
+                    <a:bodyPr/>
+                    <a:lstStyle/>
+                    <a:p>
+                      <a:r>
+                        <a:rPr lang="en-GB" dirty="0" smtClean="0"/>
+                        <a:t>No</a:t>
+                      </a:r>
+                      <a:endParaRPr lang="en-GB" dirty="0"/>
+                    </a:p>
+                  </a:txBody>
+                  <a:tcPr/>
+                </a:tc>
+                <a:tc>
+                  <a:txBody>
+                    <a:bodyPr/>
+                    <a:lstStyle/>
+                    <a:p>
+                      <a:r>
+                        <a:rPr lang="en-GB" dirty="0" smtClean="0"/>
+                        <a:t>Tue 12-13</a:t>
+                      </a:r>
+                      <a:endParaRPr lang="en-GB" dirty="0"/>
+                    </a:p>
+                  </a:txBody>
+                  <a:tcPr/>
+                </a:tc>
+                <a:tc>
+                  <a:txBody>
+                    <a:bodyPr/>
+                    <a:lstStyle/>
+                    <a:p>
+                      <a:r>
+                        <a:rPr lang="en-GB" dirty="0" smtClean="0"/>
+                        <a:t>Fri 11-12</a:t>
+                      </a:r>
+                      <a:endParaRPr lang="en-GB" dirty="0"/>
+                    </a:p>
+                  </a:txBody>
+                  <a:tcPr/>
+                </a:tc>
+                <a:tc>
+                  <a:txBody>
+                    <a:bodyPr/>
+                    <a:lstStyle/>
+                    <a:p>
+                      <a:r>
+                        <a:rPr lang="en-GB" dirty="0" smtClean="0"/>
+                        <a:t>Fri 13-14</a:t>
+                      </a:r>
+                      <a:endParaRPr lang="en-GB" dirty="0"/>
+                    </a:p>
+                  </a:txBody>
+                  <a:tcPr/>
                 </a:tc>
               </a:tr>
             </a:tbl>

</xml_diff>